<commit_message>
Updates to my github, including Youtube video link
</commit_message>
<xml_diff>
--- a/DDS Analytics for Talent Management – Case Study Presentation.pptx
+++ b/DDS Analytics for Talent Management – Case Study Presentation.pptx
@@ -18656,7 +18656,7 @@
             </a:pPr>
             <a:r>
               <a:rPr lang="en-US" dirty="0"/>
-              <a:t>Total of 870 current and formal employees</a:t>
+              <a:t>Total of 870 current and former employees</a:t>
             </a:r>
           </a:p>
           <a:p>
@@ -19479,10 +19479,10 @@
       </p:grpSpPr>
       <p:grpSp>
         <p:nvGrpSpPr>
-          <p:cNvPr id="4" name="Group 3">
+          <p:cNvPr id="7" name="Group 6">
             <a:extLst>
               <a:ext uri="{FF2B5EF4-FFF2-40B4-BE49-F238E27FC236}">
-                <a16:creationId xmlns:a16="http://schemas.microsoft.com/office/drawing/2014/main" id="{242B84F9-2178-4146-8481-417A095FCBC5}"/>
+                <a16:creationId xmlns:a16="http://schemas.microsoft.com/office/drawing/2014/main" id="{F7C18985-E7C9-42FA-BBB7-7664086C6A46}"/>
               </a:ext>
             </a:extLst>
           </p:cNvPr>
@@ -19529,10 +19529,10 @@
         </p:pic>
         <p:sp>
           <p:nvSpPr>
-            <p:cNvPr id="3" name="Oval 2">
+            <p:cNvPr id="5" name="Oval 4">
               <a:extLst>
                 <a:ext uri="{FF2B5EF4-FFF2-40B4-BE49-F238E27FC236}">
-                  <a16:creationId xmlns:a16="http://schemas.microsoft.com/office/drawing/2014/main" id="{FDCAF133-A0F6-4561-BA6A-FE2FF5877231}"/>
+                  <a16:creationId xmlns:a16="http://schemas.microsoft.com/office/drawing/2014/main" id="{5832EAAE-79F8-4217-B54C-6D356552F0DA}"/>
                 </a:ext>
               </a:extLst>
             </p:cNvPr>
@@ -19541,14 +19541,66 @@
           </p:nvSpPr>
           <p:spPr>
             <a:xfrm>
-              <a:off x="7386916" y="4052047"/>
-              <a:ext cx="466165" cy="564776"/>
+              <a:off x="8821718" y="4121523"/>
+              <a:ext cx="563880" cy="533400"/>
             </a:xfrm>
             <a:prstGeom prst="ellipse">
               <a:avLst/>
             </a:prstGeom>
             <a:noFill/>
-            <a:ln w="38100">
+            <a:ln>
+              <a:solidFill>
+                <a:schemeClr val="bg1"/>
+              </a:solidFill>
+            </a:ln>
+          </p:spPr>
+          <p:style>
+            <a:lnRef idx="2">
+              <a:schemeClr val="accent1">
+                <a:shade val="50000"/>
+              </a:schemeClr>
+            </a:lnRef>
+            <a:fillRef idx="1">
+              <a:schemeClr val="accent1"/>
+            </a:fillRef>
+            <a:effectRef idx="0">
+              <a:schemeClr val="accent1"/>
+            </a:effectRef>
+            <a:fontRef idx="minor">
+              <a:schemeClr val="lt1"/>
+            </a:fontRef>
+          </p:style>
+          <p:txBody>
+            <a:bodyPr rtlCol="0" anchor="ctr"/>
+            <a:lstStyle/>
+            <a:p>
+              <a:pPr algn="ctr"/>
+              <a:endParaRPr lang="en-US"/>
+            </a:p>
+          </p:txBody>
+        </p:sp>
+        <p:sp>
+          <p:nvSpPr>
+            <p:cNvPr id="6" name="Oval 5">
+              <a:extLst>
+                <a:ext uri="{FF2B5EF4-FFF2-40B4-BE49-F238E27FC236}">
+                  <a16:creationId xmlns:a16="http://schemas.microsoft.com/office/drawing/2014/main" id="{34BDE3DC-D5F0-4423-B04C-7F2F1F421D49}"/>
+                </a:ext>
+              </a:extLst>
+            </p:cNvPr>
+            <p:cNvSpPr/>
+            <p:nvPr/>
+          </p:nvSpPr>
+          <p:spPr>
+            <a:xfrm>
+              <a:off x="7305338" y="4022463"/>
+              <a:ext cx="563880" cy="533400"/>
+            </a:xfrm>
+            <a:prstGeom prst="ellipse">
+              <a:avLst/>
+            </a:prstGeom>
+            <a:noFill/>
+            <a:ln>
               <a:solidFill>
                 <a:schemeClr val="bg1"/>
               </a:solidFill>

</xml_diff>